<commit_message>
all new sections added. Tidy functions for charts.
</commit_message>
<xml_diff>
--- a/slides/workshopslides_HEAbespoke.pptx
+++ b/slides/workshopslides_HEAbespoke.pptx
@@ -3918,7 +3918,7 @@
         </p:spPr>
         <p:txBody>
           <a:bodyPr vert="horz" lIns="91440" tIns="45720" rIns="91440" bIns="45720" rtlCol="0">
-            <a:normAutofit/>
+            <a:normAutofit lnSpcReduction="10000"/>
           </a:bodyPr>
           <a:lstStyle>
             <a:lvl1pPr marL="182880" indent="-182880" algn="l" defTabSz="914400" rtl="0" eaLnBrk="1" latinLnBrk="0" hangingPunct="1">
@@ -4234,6 +4234,16 @@
                 </a:solidFill>
               </a:rPr>
               <a:t>w-RAP it up (everyone)</a:t>
+            </a:r>
+          </a:p>
+          <a:p>
+            <a:r>
+              <a:rPr lang="en-GB" dirty="0">
+                <a:solidFill>
+                  <a:schemeClr val="accent5"/>
+                </a:solidFill>
+              </a:rPr>
+              <a:t>Unit testing in R (optional – standalone)</a:t>
             </a:r>
           </a:p>
           <a:p>

</xml_diff>

<commit_message>
edits for HEA workshop (no git) & slight reorder
</commit_message>
<xml_diff>
--- a/slides/workshopslides_HEAbespoke.pptx
+++ b/slides/workshopslides_HEAbespoke.pptx
@@ -7,16 +7,17 @@
   <p:sldIdLst>
     <p:sldId id="256" r:id="rId2"/>
     <p:sldId id="257" r:id="rId3"/>
-    <p:sldId id="272" r:id="rId4"/>
-    <p:sldId id="268" r:id="rId5"/>
-    <p:sldId id="271" r:id="rId6"/>
-    <p:sldId id="273" r:id="rId7"/>
-    <p:sldId id="269" r:id="rId8"/>
-    <p:sldId id="270" r:id="rId9"/>
-    <p:sldId id="275" r:id="rId10"/>
-    <p:sldId id="261" r:id="rId11"/>
-    <p:sldId id="276" r:id="rId12"/>
-    <p:sldId id="274" r:id="rId13"/>
+    <p:sldId id="277" r:id="rId4"/>
+    <p:sldId id="272" r:id="rId5"/>
+    <p:sldId id="268" r:id="rId6"/>
+    <p:sldId id="271" r:id="rId7"/>
+    <p:sldId id="273" r:id="rId8"/>
+    <p:sldId id="269" r:id="rId9"/>
+    <p:sldId id="270" r:id="rId10"/>
+    <p:sldId id="275" r:id="rId11"/>
+    <p:sldId id="261" r:id="rId12"/>
+    <p:sldId id="276" r:id="rId13"/>
+    <p:sldId id="274" r:id="rId14"/>
   </p:sldIdLst>
   <p:sldSz cx="12192000" cy="6858000"/>
   <p:notesSz cx="6858000" cy="9144000"/>
@@ -126,6 +127,7 @@
         <p14:section name="Introduction" id="{00ECBA4F-322D-4FBD-9D49-C8877E291C4E}">
           <p14:sldIdLst>
             <p14:sldId id="257"/>
+            <p14:sldId id="277"/>
             <p14:sldId id="272"/>
             <p14:sldId id="268"/>
             <p14:sldId id="271"/>
@@ -351,7 +353,7 @@
           <a:p>
             <a:fld id="{7E3A1397-DDBE-4990-A86F-207B0B9A1F2C}" type="datetimeFigureOut">
               <a:rPr lang="en-GB" smtClean="0"/>
-              <a:t>14/07/2023</a:t>
+              <a:t>08/08/2023</a:t>
             </a:fld>
             <a:endParaRPr lang="en-GB"/>
           </a:p>
@@ -575,7 +577,7 @@
           <a:p>
             <a:fld id="{7E3A1397-DDBE-4990-A86F-207B0B9A1F2C}" type="datetimeFigureOut">
               <a:rPr lang="en-GB" smtClean="0"/>
-              <a:t>14/07/2023</a:t>
+              <a:t>08/08/2023</a:t>
             </a:fld>
             <a:endParaRPr lang="en-GB"/>
           </a:p>
@@ -755,7 +757,7 @@
           <a:p>
             <a:fld id="{7E3A1397-DDBE-4990-A86F-207B0B9A1F2C}" type="datetimeFigureOut">
               <a:rPr lang="en-GB" smtClean="0"/>
-              <a:t>14/07/2023</a:t>
+              <a:t>08/08/2023</a:t>
             </a:fld>
             <a:endParaRPr lang="en-GB"/>
           </a:p>
@@ -925,7 +927,7 @@
           <a:p>
             <a:fld id="{7E3A1397-DDBE-4990-A86F-207B0B9A1F2C}" type="datetimeFigureOut">
               <a:rPr lang="en-GB" smtClean="0"/>
-              <a:t>14/07/2023</a:t>
+              <a:t>08/08/2023</a:t>
             </a:fld>
             <a:endParaRPr lang="en-GB"/>
           </a:p>
@@ -1216,7 +1218,7 @@
           <a:p>
             <a:fld id="{7E3A1397-DDBE-4990-A86F-207B0B9A1F2C}" type="datetimeFigureOut">
               <a:rPr lang="en-GB" smtClean="0"/>
-              <a:t>14/07/2023</a:t>
+              <a:t>08/08/2023</a:t>
             </a:fld>
             <a:endParaRPr lang="en-GB"/>
           </a:p>
@@ -1542,7 +1544,7 @@
           <a:p>
             <a:fld id="{7E3A1397-DDBE-4990-A86F-207B0B9A1F2C}" type="datetimeFigureOut">
               <a:rPr lang="en-GB" smtClean="0"/>
-              <a:t>14/07/2023</a:t>
+              <a:t>08/08/2023</a:t>
             </a:fld>
             <a:endParaRPr lang="en-GB"/>
           </a:p>
@@ -1954,7 +1956,7 @@
           <a:p>
             <a:fld id="{7E3A1397-DDBE-4990-A86F-207B0B9A1F2C}" type="datetimeFigureOut">
               <a:rPr lang="en-GB" smtClean="0"/>
-              <a:t>14/07/2023</a:t>
+              <a:t>08/08/2023</a:t>
             </a:fld>
             <a:endParaRPr lang="en-GB"/>
           </a:p>
@@ -2072,7 +2074,7 @@
           <a:p>
             <a:fld id="{7E3A1397-DDBE-4990-A86F-207B0B9A1F2C}" type="datetimeFigureOut">
               <a:rPr lang="en-GB" smtClean="0"/>
-              <a:t>14/07/2023</a:t>
+              <a:t>08/08/2023</a:t>
             </a:fld>
             <a:endParaRPr lang="en-GB"/>
           </a:p>
@@ -2167,7 +2169,7 @@
           <a:p>
             <a:fld id="{7E3A1397-DDBE-4990-A86F-207B0B9A1F2C}" type="datetimeFigureOut">
               <a:rPr lang="en-GB" smtClean="0"/>
-              <a:t>14/07/2023</a:t>
+              <a:t>08/08/2023</a:t>
             </a:fld>
             <a:endParaRPr lang="en-GB"/>
           </a:p>
@@ -2454,7 +2456,7 @@
           <a:p>
             <a:fld id="{7E3A1397-DDBE-4990-A86F-207B0B9A1F2C}" type="datetimeFigureOut">
               <a:rPr lang="en-GB" smtClean="0"/>
-              <a:t>14/07/2023</a:t>
+              <a:t>08/08/2023</a:t>
             </a:fld>
             <a:endParaRPr lang="en-GB"/>
           </a:p>
@@ -2731,7 +2733,7 @@
           <a:p>
             <a:fld id="{7E3A1397-DDBE-4990-A86F-207B0B9A1F2C}" type="datetimeFigureOut">
               <a:rPr lang="en-GB" smtClean="0"/>
-              <a:t>14/07/2023</a:t>
+              <a:t>08/08/2023</a:t>
             </a:fld>
             <a:endParaRPr lang="en-GB"/>
           </a:p>
@@ -2982,7 +2984,7 @@
           <a:p>
             <a:fld id="{7E3A1397-DDBE-4990-A86F-207B0B9A1F2C}" type="datetimeFigureOut">
               <a:rPr lang="en-GB" smtClean="0"/>
-              <a:t>14/07/2023</a:t>
+              <a:t>08/08/2023</a:t>
             </a:fld>
             <a:endParaRPr lang="en-GB"/>
           </a:p>
@@ -3561,7 +3563,7 @@
           <p:cNvPr id="2" name="Title 1">
             <a:extLst>
               <a:ext uri="{FF2B5EF4-FFF2-40B4-BE49-F238E27FC236}">
-                <a16:creationId xmlns:a16="http://schemas.microsoft.com/office/drawing/2014/main" id="{D047F8EF-BECC-CB05-2042-8E1A2F6D1C1A}"/>
+                <a16:creationId xmlns:a16="http://schemas.microsoft.com/office/drawing/2014/main" id="{70271C04-0C12-C285-3E1B-74430A28B31B}"/>
               </a:ext>
             </a:extLst>
           </p:cNvPr>
@@ -3577,102 +3579,152 @@
           <a:bodyPr/>
           <a:lstStyle/>
           <a:p>
-            <a:r>
-              <a:rPr lang="en-GB" dirty="0"/>
-              <a:t>Getting set up</a:t>
-            </a:r>
-          </a:p>
-        </p:txBody>
-      </p:sp>
-      <p:sp>
-        <p:nvSpPr>
-          <p:cNvPr id="3" name="Content Placeholder 2">
+            <a:endParaRPr lang="en-GB"/>
+          </a:p>
+        </p:txBody>
+      </p:sp>
+      <p:pic>
+        <p:nvPicPr>
+          <p:cNvPr id="1026" name="Picture 2">
             <a:extLst>
               <a:ext uri="{FF2B5EF4-FFF2-40B4-BE49-F238E27FC236}">
-                <a16:creationId xmlns:a16="http://schemas.microsoft.com/office/drawing/2014/main" id="{476F0551-B6E7-9358-79EA-9B20DDC8DAF3}"/>
+                <a16:creationId xmlns:a16="http://schemas.microsoft.com/office/drawing/2014/main" id="{1F58B4BF-6286-D367-F8C0-6BBF6985DAFE}"/>
               </a:ext>
             </a:extLst>
           </p:cNvPr>
-          <p:cNvSpPr>
-            <a:spLocks noGrp="1"/>
-          </p:cNvSpPr>
+          <p:cNvPicPr>
+            <a:picLocks noGrp="1" noChangeAspect="1" noChangeArrowheads="1"/>
+          </p:cNvPicPr>
           <p:nvPr>
             <p:ph idx="1"/>
           </p:nvPr>
-        </p:nvSpPr>
-        <p:spPr/>
-        <p:txBody>
-          <a:bodyPr>
-            <a:normAutofit/>
-          </a:bodyPr>
-          <a:lstStyle/>
-          <a:p>
-            <a:r>
-              <a:rPr lang="en-GB" dirty="0"/>
-              <a:t>This is a </a:t>
-            </a:r>
-            <a:r>
-              <a:rPr lang="en-GB" b="1" i="1" dirty="0"/>
-              <a:t>live coding</a:t>
-            </a:r>
-            <a:r>
-              <a:rPr lang="en-GB" dirty="0"/>
-              <a:t> session, so we need you set up with git and RStudio installed…</a:t>
-            </a:r>
-          </a:p>
-          <a:p>
-            <a:r>
-              <a:rPr lang="en-GB" dirty="0"/>
-              <a:t>Open up the pdf that we’ve shared for this session or go to the following link:</a:t>
-            </a:r>
-          </a:p>
-          <a:p>
-            <a:pPr lvl="1"/>
-            <a:r>
-              <a:rPr lang="en-GB" dirty="0"/>
-              <a:t>Add the link Charlotte!</a:t>
-            </a:r>
-          </a:p>
-          <a:p>
-            <a:r>
-              <a:rPr lang="en-GB" dirty="0"/>
-              <a:t>Go to pre-workshop requirements section and check you’ve got everything from that list sorted (copied below). Get help from us if anything didn’t work!</a:t>
-            </a:r>
-          </a:p>
-          <a:p>
-            <a:pPr lvl="1"/>
-            <a:r>
-              <a:rPr lang="en-GB" dirty="0"/>
-              <a:t>Create a DfE Dev Ops account via the Service Portal;</a:t>
-            </a:r>
-          </a:p>
-          <a:p>
-            <a:pPr lvl="1"/>
-            <a:r>
-              <a:rPr lang="en-GB" dirty="0"/>
-              <a:t>Install git on your laptop: https://git-scm.com/downloads;</a:t>
-            </a:r>
-          </a:p>
-          <a:p>
-            <a:pPr lvl="1"/>
-            <a:r>
-              <a:rPr lang="en-GB" dirty="0"/>
-              <a:t>Install R-Studio on your machine: Download R for Windows (x64) and RStudio from the Software Centre on your DfE laptop.</a:t>
-            </a:r>
-          </a:p>
-          <a:p>
-            <a:pPr lvl="1"/>
-            <a:r>
-              <a:rPr lang="en-GB" dirty="0"/>
-              <a:t>Set up the path to the git.exe in RStudio global settings.</a:t>
-            </a:r>
-          </a:p>
-        </p:txBody>
-      </p:sp>
+        </p:nvPicPr>
+        <p:blipFill>
+          <a:blip r:embed="rId2">
+            <a:extLst>
+              <a:ext uri="{28A0092B-C50C-407E-A947-70E740481C1C}">
+                <a14:useLocalDpi xmlns:a14="http://schemas.microsoft.com/office/drawing/2010/main" val="0"/>
+              </a:ext>
+            </a:extLst>
+          </a:blip>
+          <a:srcRect/>
+          <a:stretch>
+            <a:fillRect/>
+          </a:stretch>
+        </p:blipFill>
+        <p:spPr bwMode="auto">
+          <a:xfrm>
+            <a:off x="1798637" y="97808"/>
+            <a:ext cx="8594725" cy="3331192"/>
+          </a:xfrm>
+          <a:prstGeom prst="rect">
+            <a:avLst/>
+          </a:prstGeom>
+          <a:noFill/>
+          <a:extLst>
+            <a:ext uri="{909E8E84-426E-40DD-AFC4-6F175D3DCCD1}">
+              <a14:hiddenFill xmlns:a14="http://schemas.microsoft.com/office/drawing/2010/main">
+                <a:solidFill>
+                  <a:srgbClr val="FFFFFF"/>
+                </a:solidFill>
+              </a14:hiddenFill>
+            </a:ext>
+          </a:extLst>
+        </p:spPr>
+      </p:pic>
+      <p:pic>
+        <p:nvPicPr>
+          <p:cNvPr id="1028" name="Picture 4">
+            <a:extLst>
+              <a:ext uri="{FF2B5EF4-FFF2-40B4-BE49-F238E27FC236}">
+                <a16:creationId xmlns:a16="http://schemas.microsoft.com/office/drawing/2014/main" id="{E87C30D8-DFD5-36C0-25BD-581F08C05B3F}"/>
+              </a:ext>
+            </a:extLst>
+          </p:cNvPr>
+          <p:cNvPicPr>
+            <a:picLocks noChangeAspect="1" noChangeArrowheads="1"/>
+          </p:cNvPicPr>
+          <p:nvPr/>
+        </p:nvPicPr>
+        <p:blipFill>
+          <a:blip r:embed="rId3">
+            <a:extLst>
+              <a:ext uri="{28A0092B-C50C-407E-A947-70E740481C1C}">
+                <a14:useLocalDpi xmlns:a14="http://schemas.microsoft.com/office/drawing/2010/main" val="0"/>
+              </a:ext>
+            </a:extLst>
+          </a:blip>
+          <a:srcRect/>
+          <a:stretch>
+            <a:fillRect/>
+          </a:stretch>
+        </p:blipFill>
+        <p:spPr bwMode="auto">
+          <a:xfrm>
+            <a:off x="618743" y="4848120"/>
+            <a:ext cx="10954512" cy="1683115"/>
+          </a:xfrm>
+          <a:prstGeom prst="rect">
+            <a:avLst/>
+          </a:prstGeom>
+          <a:noFill/>
+          <a:extLst>
+            <a:ext uri="{909E8E84-426E-40DD-AFC4-6F175D3DCCD1}">
+              <a14:hiddenFill xmlns:a14="http://schemas.microsoft.com/office/drawing/2010/main">
+                <a:solidFill>
+                  <a:srgbClr val="FFFFFF"/>
+                </a:solidFill>
+              </a14:hiddenFill>
+            </a:ext>
+          </a:extLst>
+        </p:spPr>
+      </p:pic>
+      <p:cxnSp>
+        <p:nvCxnSpPr>
+          <p:cNvPr id="5" name="Straight Arrow Connector 4">
+            <a:extLst>
+              <a:ext uri="{FF2B5EF4-FFF2-40B4-BE49-F238E27FC236}">
+                <a16:creationId xmlns:a16="http://schemas.microsoft.com/office/drawing/2014/main" id="{1E32565E-5CB9-A305-C4C9-7AA771471C03}"/>
+              </a:ext>
+            </a:extLst>
+          </p:cNvPr>
+          <p:cNvCxnSpPr/>
+          <p:nvPr/>
+        </p:nvCxnSpPr>
+        <p:spPr>
+          <a:xfrm>
+            <a:off x="6108192" y="3614468"/>
+            <a:ext cx="0" cy="1052423"/>
+          </a:xfrm>
+          <a:prstGeom prst="straightConnector1">
+            <a:avLst/>
+          </a:prstGeom>
+          <a:ln w="76200">
+            <a:solidFill>
+              <a:schemeClr val="tx1"/>
+            </a:solidFill>
+            <a:tailEnd type="triangle"/>
+          </a:ln>
+        </p:spPr>
+        <p:style>
+          <a:lnRef idx="1">
+            <a:schemeClr val="accent1"/>
+          </a:lnRef>
+          <a:fillRef idx="0">
+            <a:schemeClr val="accent1"/>
+          </a:fillRef>
+          <a:effectRef idx="0">
+            <a:schemeClr val="accent1"/>
+          </a:effectRef>
+          <a:fontRef idx="minor">
+            <a:schemeClr val="tx1"/>
+          </a:fontRef>
+        </p:style>
+      </p:cxnSp>
     </p:spTree>
     <p:extLst>
       <p:ext uri="{BB962C8B-B14F-4D97-AF65-F5344CB8AC3E}">
-        <p14:creationId xmlns:p14="http://schemas.microsoft.com/office/powerpoint/2010/main" val="916788589"/>
+        <p14:creationId xmlns:p14="http://schemas.microsoft.com/office/powerpoint/2010/main" val="2713344255"/>
       </p:ext>
     </p:extLst>
   </p:cSld>
@@ -3704,6 +3756,149 @@
           <p:cNvPr id="2" name="Title 1">
             <a:extLst>
               <a:ext uri="{FF2B5EF4-FFF2-40B4-BE49-F238E27FC236}">
+                <a16:creationId xmlns:a16="http://schemas.microsoft.com/office/drawing/2014/main" id="{D047F8EF-BECC-CB05-2042-8E1A2F6D1C1A}"/>
+              </a:ext>
+            </a:extLst>
+          </p:cNvPr>
+          <p:cNvSpPr>
+            <a:spLocks noGrp="1"/>
+          </p:cNvSpPr>
+          <p:nvPr>
+            <p:ph type="title"/>
+          </p:nvPr>
+        </p:nvSpPr>
+        <p:spPr/>
+        <p:txBody>
+          <a:bodyPr/>
+          <a:lstStyle/>
+          <a:p>
+            <a:r>
+              <a:rPr lang="en-GB" dirty="0"/>
+              <a:t>Getting set up</a:t>
+            </a:r>
+          </a:p>
+        </p:txBody>
+      </p:sp>
+      <p:sp>
+        <p:nvSpPr>
+          <p:cNvPr id="3" name="Content Placeholder 2">
+            <a:extLst>
+              <a:ext uri="{FF2B5EF4-FFF2-40B4-BE49-F238E27FC236}">
+                <a16:creationId xmlns:a16="http://schemas.microsoft.com/office/drawing/2014/main" id="{476F0551-B6E7-9358-79EA-9B20DDC8DAF3}"/>
+              </a:ext>
+            </a:extLst>
+          </p:cNvPr>
+          <p:cNvSpPr>
+            <a:spLocks noGrp="1"/>
+          </p:cNvSpPr>
+          <p:nvPr>
+            <p:ph idx="1"/>
+          </p:nvPr>
+        </p:nvSpPr>
+        <p:spPr/>
+        <p:txBody>
+          <a:bodyPr>
+            <a:normAutofit/>
+          </a:bodyPr>
+          <a:lstStyle/>
+          <a:p>
+            <a:r>
+              <a:rPr lang="en-GB" dirty="0"/>
+              <a:t>This is a </a:t>
+            </a:r>
+            <a:r>
+              <a:rPr lang="en-GB" b="1" i="1" dirty="0"/>
+              <a:t>live coding</a:t>
+            </a:r>
+            <a:r>
+              <a:rPr lang="en-GB" dirty="0"/>
+              <a:t> session, so we need you set up with git and RStudio installed…</a:t>
+            </a:r>
+          </a:p>
+          <a:p>
+            <a:r>
+              <a:rPr lang="en-GB" dirty="0"/>
+              <a:t>Open up the pdf that we’ve shared for this session or go to the following link:</a:t>
+            </a:r>
+          </a:p>
+          <a:p>
+            <a:pPr lvl="1"/>
+            <a:r>
+              <a:rPr lang="en-GB" dirty="0"/>
+              <a:t>Add the link Charlotte!</a:t>
+            </a:r>
+          </a:p>
+          <a:p>
+            <a:r>
+              <a:rPr lang="en-GB" dirty="0"/>
+              <a:t>Go to pre-workshop requirements section and check you’ve got everything from that list sorted (copied below). Get help from us if anything didn’t work!</a:t>
+            </a:r>
+          </a:p>
+          <a:p>
+            <a:pPr lvl="1"/>
+            <a:r>
+              <a:rPr lang="en-GB" dirty="0"/>
+              <a:t>Create a DfE Dev Ops account via the Service Portal;</a:t>
+            </a:r>
+          </a:p>
+          <a:p>
+            <a:pPr lvl="1"/>
+            <a:r>
+              <a:rPr lang="en-GB" dirty="0"/>
+              <a:t>Install git on your laptop: https://git-scm.com/downloads;</a:t>
+            </a:r>
+          </a:p>
+          <a:p>
+            <a:pPr lvl="1"/>
+            <a:r>
+              <a:rPr lang="en-GB" dirty="0"/>
+              <a:t>Install R-Studio on your machine: Download R for Windows (x64) and RStudio from the Software Centre on your DfE laptop.</a:t>
+            </a:r>
+          </a:p>
+          <a:p>
+            <a:pPr lvl="1"/>
+            <a:r>
+              <a:rPr lang="en-GB" dirty="0"/>
+              <a:t>Set up the path to the git.exe in RStudio global settings.</a:t>
+            </a:r>
+          </a:p>
+        </p:txBody>
+      </p:sp>
+    </p:spTree>
+    <p:extLst>
+      <p:ext uri="{BB962C8B-B14F-4D97-AF65-F5344CB8AC3E}">
+        <p14:creationId xmlns:p14="http://schemas.microsoft.com/office/powerpoint/2010/main" val="916788589"/>
+      </p:ext>
+    </p:extLst>
+  </p:cSld>
+  <p:clrMapOvr>
+    <a:masterClrMapping/>
+  </p:clrMapOvr>
+</p:sld>
+</file>
+
+<file path=ppt/slides/slide12.xml><?xml version="1.0" encoding="utf-8"?>
+<p:sld xmlns:a="http://schemas.openxmlformats.org/drawingml/2006/main" xmlns:r="http://schemas.openxmlformats.org/officeDocument/2006/relationships" xmlns:p="http://schemas.openxmlformats.org/presentationml/2006/main">
+  <p:cSld>
+    <p:spTree>
+      <p:nvGrpSpPr>
+        <p:cNvPr id="1" name=""/>
+        <p:cNvGrpSpPr/>
+        <p:nvPr/>
+      </p:nvGrpSpPr>
+      <p:grpSpPr>
+        <a:xfrm>
+          <a:off x="0" y="0"/>
+          <a:ext cx="0" cy="0"/>
+          <a:chOff x="0" y="0"/>
+          <a:chExt cx="0" cy="0"/>
+        </a:xfrm>
+      </p:grpSpPr>
+      <p:sp>
+        <p:nvSpPr>
+          <p:cNvPr id="2" name="Title 1">
+            <a:extLst>
+              <a:ext uri="{FF2B5EF4-FFF2-40B4-BE49-F238E27FC236}">
                 <a16:creationId xmlns:a16="http://schemas.microsoft.com/office/drawing/2014/main" id="{88D5E3D0-6F78-C65E-3F15-F318DE8EA252}"/>
               </a:ext>
             </a:extLst>
@@ -3771,7 +3966,25 @@
                   <a:srgbClr val="00B050"/>
                 </a:solidFill>
               </a:rPr>
-              <a:t>Creating a project and cloning repositories (everyone) </a:t>
+              <a:t>Creating a project (everyone)</a:t>
+            </a:r>
+          </a:p>
+          <a:p>
+            <a:r>
+              <a:rPr lang="en-GB">
+                <a:solidFill>
+                  <a:schemeClr val="accent5"/>
+                </a:solidFill>
+              </a:rPr>
+              <a:t>Using renv</a:t>
+            </a:r>
+            <a:r>
+              <a:rPr lang="en-GB" dirty="0">
+                <a:solidFill>
+                  <a:schemeClr val="accent5"/>
+                </a:solidFill>
+              </a:rPr>
+              <a:t> (optional) </a:t>
             </a:r>
           </a:p>
           <a:p>
@@ -3789,10 +4002,10 @@
             <a:r>
               <a:rPr lang="en-GB" dirty="0">
                 <a:solidFill>
-                  <a:srgbClr val="00B050"/>
+                  <a:schemeClr val="accent5"/>
                 </a:solidFill>
               </a:rPr>
-              <a:t>Comments and headings (everyone)</a:t>
+              <a:t>Comments and headings (optional)</a:t>
             </a:r>
           </a:p>
           <a:p>
@@ -3800,10 +4013,10 @@
             <a:r>
               <a:rPr lang="en-GB" dirty="0">
                 <a:solidFill>
-                  <a:srgbClr val="00B050"/>
+                  <a:schemeClr val="accent5"/>
                 </a:solidFill>
               </a:rPr>
-              <a:t>Adding and running code (everyone)</a:t>
+              <a:t>Adding and running code (optional)</a:t>
             </a:r>
           </a:p>
           <a:p>
@@ -3854,10 +4067,10 @@
             <a:r>
               <a:rPr lang="en-GB" dirty="0">
                 <a:solidFill>
-                  <a:srgbClr val="00B050"/>
+                  <a:schemeClr val="accent5"/>
                 </a:solidFill>
               </a:rPr>
-              <a:t>Cleaning data (everyone)</a:t>
+              <a:t>Cleaning data (optional)</a:t>
             </a:r>
           </a:p>
           <a:p>
@@ -4325,7 +4538,7 @@
 </p:sld>
 </file>
 
-<file path=ppt/slides/slide12.xml><?xml version="1.0" encoding="utf-8"?>
+<file path=ppt/slides/slide13.xml><?xml version="1.0" encoding="utf-8"?>
 <p:sld xmlns:a="http://schemas.openxmlformats.org/drawingml/2006/main" xmlns:r="http://schemas.openxmlformats.org/officeDocument/2006/relationships" xmlns:p="http://schemas.openxmlformats.org/presentationml/2006/main">
   <p:cSld>
     <p:spTree>
@@ -4595,6 +4808,91 @@
 
 <file path=ppt/slides/slide3.xml><?xml version="1.0" encoding="utf-8"?>
 <p:sld xmlns:a="http://schemas.openxmlformats.org/drawingml/2006/main" xmlns:r="http://schemas.openxmlformats.org/officeDocument/2006/relationships" xmlns:p="http://schemas.openxmlformats.org/presentationml/2006/main">
+  <p:cSld>
+    <p:spTree>
+      <p:nvGrpSpPr>
+        <p:cNvPr id="1" name=""/>
+        <p:cNvGrpSpPr/>
+        <p:nvPr/>
+      </p:nvGrpSpPr>
+      <p:grpSpPr>
+        <a:xfrm>
+          <a:off x="0" y="0"/>
+          <a:ext cx="0" cy="0"/>
+          <a:chOff x="0" y="0"/>
+          <a:chExt cx="0" cy="0"/>
+        </a:xfrm>
+      </p:grpSpPr>
+      <p:sp>
+        <p:nvSpPr>
+          <p:cNvPr id="2" name="Title 1">
+            <a:extLst>
+              <a:ext uri="{FF2B5EF4-FFF2-40B4-BE49-F238E27FC236}">
+                <a16:creationId xmlns:a16="http://schemas.microsoft.com/office/drawing/2014/main" id="{3F7248CA-32A0-7285-9508-91F31A882237}"/>
+              </a:ext>
+            </a:extLst>
+          </p:cNvPr>
+          <p:cNvSpPr>
+            <a:spLocks noGrp="1"/>
+          </p:cNvSpPr>
+          <p:nvPr>
+            <p:ph type="title"/>
+          </p:nvPr>
+        </p:nvSpPr>
+        <p:spPr/>
+        <p:txBody>
+          <a:bodyPr>
+            <a:normAutofit fontScale="90000"/>
+          </a:bodyPr>
+          <a:lstStyle/>
+          <a:p>
+            <a:r>
+              <a:rPr lang="en-GB" dirty="0"/>
+              <a:t>What are your key pain points/struggles with R at the moment?</a:t>
+            </a:r>
+          </a:p>
+        </p:txBody>
+      </p:sp>
+      <p:sp>
+        <p:nvSpPr>
+          <p:cNvPr id="3" name="Content Placeholder 2">
+            <a:extLst>
+              <a:ext uri="{FF2B5EF4-FFF2-40B4-BE49-F238E27FC236}">
+                <a16:creationId xmlns:a16="http://schemas.microsoft.com/office/drawing/2014/main" id="{45141A04-D5F3-C136-741E-B757512084BC}"/>
+              </a:ext>
+            </a:extLst>
+          </p:cNvPr>
+          <p:cNvSpPr>
+            <a:spLocks noGrp="1"/>
+          </p:cNvSpPr>
+          <p:nvPr>
+            <p:ph idx="1"/>
+          </p:nvPr>
+        </p:nvSpPr>
+        <p:spPr/>
+        <p:txBody>
+          <a:bodyPr/>
+          <a:lstStyle/>
+          <a:p>
+            <a:endParaRPr lang="en-GB"/>
+          </a:p>
+        </p:txBody>
+      </p:sp>
+    </p:spTree>
+    <p:extLst>
+      <p:ext uri="{BB962C8B-B14F-4D97-AF65-F5344CB8AC3E}">
+        <p14:creationId xmlns:p14="http://schemas.microsoft.com/office/powerpoint/2010/main" val="313665197"/>
+      </p:ext>
+    </p:extLst>
+  </p:cSld>
+  <p:clrMapOvr>
+    <a:masterClrMapping/>
+  </p:clrMapOvr>
+</p:sld>
+</file>
+
+<file path=ppt/slides/slide4.xml><?xml version="1.0" encoding="utf-8"?>
+<p:sld xmlns:a="http://schemas.openxmlformats.org/drawingml/2006/main" xmlns:r="http://schemas.openxmlformats.org/officeDocument/2006/relationships" xmlns:p="http://schemas.openxmlformats.org/presentationml/2006/main" show="0">
   <p:cSld>
     <p:spTree>
       <p:nvGrpSpPr>
@@ -5036,119 +5334,6 @@
 </p:sld>
 </file>
 
-<file path=ppt/slides/slide4.xml><?xml version="1.0" encoding="utf-8"?>
-<p:sld xmlns:a="http://schemas.openxmlformats.org/drawingml/2006/main" xmlns:r="http://schemas.openxmlformats.org/officeDocument/2006/relationships" xmlns:p="http://schemas.openxmlformats.org/presentationml/2006/main">
-  <p:cSld>
-    <p:spTree>
-      <p:nvGrpSpPr>
-        <p:cNvPr id="1" name=""/>
-        <p:cNvGrpSpPr/>
-        <p:nvPr/>
-      </p:nvGrpSpPr>
-      <p:grpSpPr>
-        <a:xfrm>
-          <a:off x="0" y="0"/>
-          <a:ext cx="0" cy="0"/>
-          <a:chOff x="0" y="0"/>
-          <a:chExt cx="0" cy="0"/>
-        </a:xfrm>
-      </p:grpSpPr>
-      <p:sp>
-        <p:nvSpPr>
-          <p:cNvPr id="2" name="Title 1">
-            <a:extLst>
-              <a:ext uri="{FF2B5EF4-FFF2-40B4-BE49-F238E27FC236}">
-                <a16:creationId xmlns:a16="http://schemas.microsoft.com/office/drawing/2014/main" id="{6FCF0915-82AB-EF2E-6E65-9B4AE665E091}"/>
-              </a:ext>
-            </a:extLst>
-          </p:cNvPr>
-          <p:cNvSpPr>
-            <a:spLocks noGrp="1"/>
-          </p:cNvSpPr>
-          <p:nvPr>
-            <p:ph type="title"/>
-          </p:nvPr>
-        </p:nvSpPr>
-        <p:spPr/>
-        <p:txBody>
-          <a:bodyPr/>
-          <a:lstStyle/>
-          <a:p>
-            <a:r>
-              <a:rPr lang="en-GB" dirty="0"/>
-              <a:t>What is R?</a:t>
-            </a:r>
-          </a:p>
-        </p:txBody>
-      </p:sp>
-      <p:sp>
-        <p:nvSpPr>
-          <p:cNvPr id="3" name="Content Placeholder 2">
-            <a:extLst>
-              <a:ext uri="{FF2B5EF4-FFF2-40B4-BE49-F238E27FC236}">
-                <a16:creationId xmlns:a16="http://schemas.microsoft.com/office/drawing/2014/main" id="{4DC9CE65-9442-8FB9-7571-B418217290A2}"/>
-              </a:ext>
-            </a:extLst>
-          </p:cNvPr>
-          <p:cNvSpPr>
-            <a:spLocks noGrp="1"/>
-          </p:cNvSpPr>
-          <p:nvPr>
-            <p:ph idx="1"/>
-          </p:nvPr>
-        </p:nvSpPr>
-        <p:spPr/>
-        <p:txBody>
-          <a:bodyPr/>
-          <a:lstStyle/>
-          <a:p>
-            <a:r>
-              <a:rPr lang="en-GB" dirty="0"/>
-              <a:t>R is a coding language. There are many different languages of code, some others include SQL, python, JavaScript and many more. They all have benefits, and the difference is often the syntax used (literally like learning new languages!) </a:t>
-            </a:r>
-          </a:p>
-          <a:p>
-            <a:r>
-              <a:rPr lang="en-GB" dirty="0"/>
-              <a:t>R is open-source, meaning it is free, anyone can use it and anyone can contribute to developing new ‘packages’.</a:t>
-            </a:r>
-          </a:p>
-          <a:p>
-            <a:pPr lvl="1"/>
-            <a:r>
-              <a:rPr lang="en-GB" dirty="0"/>
-              <a:t>A package is a set of functions someone else has written and tied together in a nice neat bow, ready for you to use! You simply install the package, and then you have all of the functions available. </a:t>
-            </a:r>
-          </a:p>
-          <a:p>
-            <a:pPr lvl="1"/>
-            <a:r>
-              <a:rPr lang="en-GB" dirty="0"/>
-              <a:t>A function is a chunk of code that has been grouped together, given a name, and often has ‘place holders’ you can change, such that you can use that name to run that code, and apply it to different data. </a:t>
-            </a:r>
-          </a:p>
-          <a:p>
-            <a:pPr lvl="2"/>
-            <a:r>
-              <a:rPr lang="en-GB" dirty="0"/>
-              <a:t>(for example, mean(x) is a function that calculates the arithmetic mean of x. You replace x with any numeric data.)</a:t>
-            </a:r>
-          </a:p>
-        </p:txBody>
-      </p:sp>
-    </p:spTree>
-    <p:extLst>
-      <p:ext uri="{BB962C8B-B14F-4D97-AF65-F5344CB8AC3E}">
-        <p14:creationId xmlns:p14="http://schemas.microsoft.com/office/powerpoint/2010/main" val="4123275360"/>
-      </p:ext>
-    </p:extLst>
-  </p:cSld>
-  <p:clrMapOvr>
-    <a:masterClrMapping/>
-  </p:clrMapOvr>
-</p:sld>
-</file>
-
 <file path=ppt/slides/slide5.xml><?xml version="1.0" encoding="utf-8"?>
 <p:sld xmlns:a="http://schemas.openxmlformats.org/drawingml/2006/main" xmlns:r="http://schemas.openxmlformats.org/officeDocument/2006/relationships" xmlns:p="http://schemas.openxmlformats.org/presentationml/2006/main">
   <p:cSld>
@@ -5171,6 +5356,119 @@
           <p:cNvPr id="2" name="Title 1">
             <a:extLst>
               <a:ext uri="{FF2B5EF4-FFF2-40B4-BE49-F238E27FC236}">
+                <a16:creationId xmlns:a16="http://schemas.microsoft.com/office/drawing/2014/main" id="{6FCF0915-82AB-EF2E-6E65-9B4AE665E091}"/>
+              </a:ext>
+            </a:extLst>
+          </p:cNvPr>
+          <p:cNvSpPr>
+            <a:spLocks noGrp="1"/>
+          </p:cNvSpPr>
+          <p:nvPr>
+            <p:ph type="title"/>
+          </p:nvPr>
+        </p:nvSpPr>
+        <p:spPr/>
+        <p:txBody>
+          <a:bodyPr/>
+          <a:lstStyle/>
+          <a:p>
+            <a:r>
+              <a:rPr lang="en-GB" dirty="0"/>
+              <a:t>What is R?</a:t>
+            </a:r>
+          </a:p>
+        </p:txBody>
+      </p:sp>
+      <p:sp>
+        <p:nvSpPr>
+          <p:cNvPr id="3" name="Content Placeholder 2">
+            <a:extLst>
+              <a:ext uri="{FF2B5EF4-FFF2-40B4-BE49-F238E27FC236}">
+                <a16:creationId xmlns:a16="http://schemas.microsoft.com/office/drawing/2014/main" id="{4DC9CE65-9442-8FB9-7571-B418217290A2}"/>
+              </a:ext>
+            </a:extLst>
+          </p:cNvPr>
+          <p:cNvSpPr>
+            <a:spLocks noGrp="1"/>
+          </p:cNvSpPr>
+          <p:nvPr>
+            <p:ph idx="1"/>
+          </p:nvPr>
+        </p:nvSpPr>
+        <p:spPr/>
+        <p:txBody>
+          <a:bodyPr/>
+          <a:lstStyle/>
+          <a:p>
+            <a:r>
+              <a:rPr lang="en-GB" dirty="0"/>
+              <a:t>R is a coding language. There are many different languages of code, some others include SQL, python, JavaScript and many more. They all have benefits, and the difference is often the syntax used (literally like learning new languages!) </a:t>
+            </a:r>
+          </a:p>
+          <a:p>
+            <a:r>
+              <a:rPr lang="en-GB" dirty="0"/>
+              <a:t>R is open-source, meaning it is free, anyone can use it and anyone can contribute to developing new ‘packages’.</a:t>
+            </a:r>
+          </a:p>
+          <a:p>
+            <a:pPr lvl="1"/>
+            <a:r>
+              <a:rPr lang="en-GB" dirty="0"/>
+              <a:t>A package is a set of functions someone else has written and tied together in a nice neat bow, ready for you to use! You simply install the package, and then you have all of the functions available. </a:t>
+            </a:r>
+          </a:p>
+          <a:p>
+            <a:pPr lvl="1"/>
+            <a:r>
+              <a:rPr lang="en-GB" dirty="0"/>
+              <a:t>A function is a chunk of code that has been grouped together, given a name, and often has ‘place holders’ you can change, such that you can use that name to run that code, and apply it to different data. </a:t>
+            </a:r>
+          </a:p>
+          <a:p>
+            <a:pPr lvl="2"/>
+            <a:r>
+              <a:rPr lang="en-GB" dirty="0"/>
+              <a:t>(for example, mean(x) is a function that calculates the arithmetic mean of x. You replace x with any numeric data.)</a:t>
+            </a:r>
+          </a:p>
+        </p:txBody>
+      </p:sp>
+    </p:spTree>
+    <p:extLst>
+      <p:ext uri="{BB962C8B-B14F-4D97-AF65-F5344CB8AC3E}">
+        <p14:creationId xmlns:p14="http://schemas.microsoft.com/office/powerpoint/2010/main" val="4123275360"/>
+      </p:ext>
+    </p:extLst>
+  </p:cSld>
+  <p:clrMapOvr>
+    <a:masterClrMapping/>
+  </p:clrMapOvr>
+</p:sld>
+</file>
+
+<file path=ppt/slides/slide6.xml><?xml version="1.0" encoding="utf-8"?>
+<p:sld xmlns:a="http://schemas.openxmlformats.org/drawingml/2006/main" xmlns:r="http://schemas.openxmlformats.org/officeDocument/2006/relationships" xmlns:p="http://schemas.openxmlformats.org/presentationml/2006/main">
+  <p:cSld>
+    <p:spTree>
+      <p:nvGrpSpPr>
+        <p:cNvPr id="1" name=""/>
+        <p:cNvGrpSpPr/>
+        <p:nvPr/>
+      </p:nvGrpSpPr>
+      <p:grpSpPr>
+        <a:xfrm>
+          <a:off x="0" y="0"/>
+          <a:ext cx="0" cy="0"/>
+          <a:chOff x="0" y="0"/>
+          <a:chExt cx="0" cy="0"/>
+        </a:xfrm>
+      </p:grpSpPr>
+      <p:sp>
+        <p:nvSpPr>
+          <p:cNvPr id="2" name="Title 1">
+            <a:extLst>
+              <a:ext uri="{FF2B5EF4-FFF2-40B4-BE49-F238E27FC236}">
                 <a16:creationId xmlns:a16="http://schemas.microsoft.com/office/drawing/2014/main" id="{330580FA-7B1A-DE39-0F93-0C03FAEDEE67}"/>
               </a:ext>
             </a:extLst>
@@ -5249,7 +5547,7 @@
 </p:sld>
 </file>
 
-<file path=ppt/slides/slide6.xml><?xml version="1.0" encoding="utf-8"?>
+<file path=ppt/slides/slide7.xml><?xml version="1.0" encoding="utf-8"?>
 <p:sld xmlns:a="http://schemas.openxmlformats.org/drawingml/2006/main" xmlns:r="http://schemas.openxmlformats.org/officeDocument/2006/relationships" xmlns:p="http://schemas.openxmlformats.org/presentationml/2006/main">
   <p:cSld>
     <p:spTree>
@@ -5748,151 +6046,6 @@
 </p:sld>
 </file>
 
-<file path=ppt/slides/slide7.xml><?xml version="1.0" encoding="utf-8"?>
-<p:sld xmlns:a="http://schemas.openxmlformats.org/drawingml/2006/main" xmlns:r="http://schemas.openxmlformats.org/officeDocument/2006/relationships" xmlns:p="http://schemas.openxmlformats.org/presentationml/2006/main">
-  <p:cSld>
-    <p:spTree>
-      <p:nvGrpSpPr>
-        <p:cNvPr id="1" name=""/>
-        <p:cNvGrpSpPr/>
-        <p:nvPr/>
-      </p:nvGrpSpPr>
-      <p:grpSpPr>
-        <a:xfrm>
-          <a:off x="0" y="0"/>
-          <a:ext cx="0" cy="0"/>
-          <a:chOff x="0" y="0"/>
-          <a:chExt cx="0" cy="0"/>
-        </a:xfrm>
-      </p:grpSpPr>
-      <p:sp>
-        <p:nvSpPr>
-          <p:cNvPr id="2" name="Title 1">
-            <a:extLst>
-              <a:ext uri="{FF2B5EF4-FFF2-40B4-BE49-F238E27FC236}">
-                <a16:creationId xmlns:a16="http://schemas.microsoft.com/office/drawing/2014/main" id="{DD7F82BF-1B0B-A48E-3017-2E93FCD61287}"/>
-              </a:ext>
-            </a:extLst>
-          </p:cNvPr>
-          <p:cNvSpPr>
-            <a:spLocks noGrp="1"/>
-          </p:cNvSpPr>
-          <p:nvPr>
-            <p:ph type="title"/>
-          </p:nvPr>
-        </p:nvSpPr>
-        <p:spPr/>
-        <p:txBody>
-          <a:bodyPr/>
-          <a:lstStyle/>
-          <a:p>
-            <a:r>
-              <a:rPr lang="en-GB" dirty="0"/>
-              <a:t>What is RAP?</a:t>
-            </a:r>
-          </a:p>
-        </p:txBody>
-      </p:sp>
-      <p:sp>
-        <p:nvSpPr>
-          <p:cNvPr id="3" name="Content Placeholder 2">
-            <a:extLst>
-              <a:ext uri="{FF2B5EF4-FFF2-40B4-BE49-F238E27FC236}">
-                <a16:creationId xmlns:a16="http://schemas.microsoft.com/office/drawing/2014/main" id="{D23D0DCF-B52A-51B9-E9E1-B1BF01360E12}"/>
-              </a:ext>
-            </a:extLst>
-          </p:cNvPr>
-          <p:cNvSpPr>
-            <a:spLocks noGrp="1"/>
-          </p:cNvSpPr>
-          <p:nvPr>
-            <p:ph idx="1"/>
-          </p:nvPr>
-        </p:nvSpPr>
-        <p:spPr/>
-        <p:txBody>
-          <a:bodyPr>
-            <a:normAutofit lnSpcReduction="10000"/>
-          </a:bodyPr>
-          <a:lstStyle/>
-          <a:p>
-            <a:r>
-              <a:rPr lang="en-GB" dirty="0"/>
-              <a:t>RAP stands for </a:t>
-            </a:r>
-            <a:r>
-              <a:rPr lang="en-GB" b="1" u="sng" dirty="0"/>
-              <a:t>R</a:t>
-            </a:r>
-            <a:r>
-              <a:rPr lang="en-GB" dirty="0"/>
-              <a:t>eproducible </a:t>
-            </a:r>
-            <a:r>
-              <a:rPr lang="en-GB" b="1" u="sng" dirty="0"/>
-              <a:t>A</a:t>
-            </a:r>
-            <a:r>
-              <a:rPr lang="en-GB" dirty="0"/>
-              <a:t>nalytical </a:t>
-            </a:r>
-            <a:r>
-              <a:rPr lang="en-GB" b="1" u="sng" dirty="0"/>
-              <a:t>P</a:t>
-            </a:r>
-            <a:r>
-              <a:rPr lang="en-GB" dirty="0"/>
-              <a:t>ipeline. The full words still hide the true meaning behind buzzwords and jargon though. What it actually means is using automation to our advantage when analysing data (this is as simple as writing code such as an R script that we can click a button to execute and do the job for us), and ensuring we are transparent. </a:t>
-            </a:r>
-          </a:p>
-          <a:p>
-            <a:r>
-              <a:rPr lang="en-GB" dirty="0"/>
-              <a:t>Using R (the coding language) really helps us to put the R in RAP ('reproducible'). Ask yourself, </a:t>
-            </a:r>
-          </a:p>
-          <a:p>
-            <a:pPr lvl="1"/>
-            <a:r>
-              <a:rPr lang="en-GB" dirty="0"/>
-              <a:t>If someone else picked up your work, could they easily reproduce your exact outputs? </a:t>
-            </a:r>
-          </a:p>
-          <a:p>
-            <a:pPr lvl="1"/>
-            <a:r>
-              <a:rPr lang="en-GB" dirty="0"/>
-              <a:t>When the time comes around to update your analysis with new data, how easy is it for you to reproduce the analysis you need? </a:t>
-            </a:r>
-          </a:p>
-          <a:p>
-            <a:pPr lvl="1"/>
-            <a:r>
-              <a:rPr lang="en-GB" dirty="0"/>
-              <a:t>Can the public reproduce your analysis?</a:t>
-            </a:r>
-          </a:p>
-          <a:p>
-            <a:r>
-              <a:rPr lang="en-GB" dirty="0"/>
-              <a:t>In an ideal RAP, it would be as simple as plugging the new data in and clicking 'go', with no need to manually scroll through multiple scripts updating the year in every file name or the variable name that's changed from using _ to -.</a:t>
-            </a:r>
-          </a:p>
-        </p:txBody>
-      </p:sp>
-    </p:spTree>
-    <p:extLst>
-      <p:ext uri="{BB962C8B-B14F-4D97-AF65-F5344CB8AC3E}">
-        <p14:creationId xmlns:p14="http://schemas.microsoft.com/office/powerpoint/2010/main" val="1410471086"/>
-      </p:ext>
-    </p:extLst>
-  </p:cSld>
-  <p:clrMapOvr>
-    <a:masterClrMapping/>
-  </p:clrMapOvr>
-</p:sld>
-</file>
-
 <file path=ppt/slides/slide8.xml><?xml version="1.0" encoding="utf-8"?>
 <p:sld xmlns:a="http://schemas.openxmlformats.org/drawingml/2006/main" xmlns:r="http://schemas.openxmlformats.org/officeDocument/2006/relationships" xmlns:p="http://schemas.openxmlformats.org/presentationml/2006/main">
   <p:cSld>
@@ -5915,7 +6068,7 @@
           <p:cNvPr id="2" name="Title 1">
             <a:extLst>
               <a:ext uri="{FF2B5EF4-FFF2-40B4-BE49-F238E27FC236}">
-                <a16:creationId xmlns:a16="http://schemas.microsoft.com/office/drawing/2014/main" id="{4EBAFED2-1C42-5651-163B-8818BBF3005F}"/>
+                <a16:creationId xmlns:a16="http://schemas.microsoft.com/office/drawing/2014/main" id="{DD7F82BF-1B0B-A48E-3017-2E93FCD61287}"/>
               </a:ext>
             </a:extLst>
           </p:cNvPr>
@@ -5933,7 +6086,7 @@
           <a:p>
             <a:r>
               <a:rPr lang="en-GB" dirty="0"/>
-              <a:t>What are the benefits?</a:t>
+              <a:t>What is RAP?</a:t>
             </a:r>
           </a:p>
         </p:txBody>
@@ -5943,7 +6096,7 @@
           <p:cNvPr id="3" name="Content Placeholder 2">
             <a:extLst>
               <a:ext uri="{FF2B5EF4-FFF2-40B4-BE49-F238E27FC236}">
-                <a16:creationId xmlns:a16="http://schemas.microsoft.com/office/drawing/2014/main" id="{F3EFC132-8AC8-5B25-3629-B38C66AF4818}"/>
+                <a16:creationId xmlns:a16="http://schemas.microsoft.com/office/drawing/2014/main" id="{D23D0DCF-B52A-51B9-E9E1-B1BF01360E12}"/>
               </a:ext>
             </a:extLst>
           </p:cNvPr>
@@ -5956,45 +6109,71 @@
         </p:nvSpPr>
         <p:spPr/>
         <p:txBody>
-          <a:bodyPr/>
-          <a:lstStyle/>
-          <a:p>
-            <a:r>
-              <a:rPr lang="en-GB" dirty="0"/>
-              <a:t>We already have ‘analytical pipelines’ and have done for many years. The aim of RAP is to;</a:t>
+          <a:bodyPr>
+            <a:normAutofit lnSpcReduction="10000"/>
+          </a:bodyPr>
+          <a:lstStyle/>
+          <a:p>
+            <a:r>
+              <a:rPr lang="en-GB" dirty="0"/>
+              <a:t>RAP stands for </a:t>
+            </a:r>
+            <a:r>
+              <a:rPr lang="en-GB" b="1" u="sng" dirty="0"/>
+              <a:t>R</a:t>
+            </a:r>
+            <a:r>
+              <a:rPr lang="en-GB" dirty="0"/>
+              <a:t>eproducible </a:t>
+            </a:r>
+            <a:r>
+              <a:rPr lang="en-GB" b="1" u="sng" dirty="0"/>
+              <a:t>A</a:t>
+            </a:r>
+            <a:r>
+              <a:rPr lang="en-GB" dirty="0"/>
+              <a:t>nalytical </a:t>
+            </a:r>
+            <a:r>
+              <a:rPr lang="en-GB" b="1" u="sng" dirty="0"/>
+              <a:t>P</a:t>
+            </a:r>
+            <a:r>
+              <a:rPr lang="en-GB" dirty="0"/>
+              <a:t>ipeline. The full words still hide the true meaning behind buzzwords and jargon though. What it actually means is using automation to our advantage when analysing data (this is as simple as writing code such as an R script that we can click a button to execute and do the job for us), and ensuring we are transparent. </a:t>
+            </a:r>
+          </a:p>
+          <a:p>
+            <a:r>
+              <a:rPr lang="en-GB" dirty="0"/>
+              <a:t>Using R (the coding language) really helps us to put the R in RAP ('reproducible'). Ask yourself, </a:t>
             </a:r>
           </a:p>
           <a:p>
             <a:pPr lvl="1"/>
             <a:r>
               <a:rPr lang="en-GB" dirty="0"/>
-              <a:t>Automate the parts of these pipelines that can be automated,</a:t>
+              <a:t>If someone else picked up your work, could they easily reproduce your exact outputs? </a:t>
             </a:r>
           </a:p>
           <a:p>
             <a:pPr lvl="1"/>
             <a:r>
               <a:rPr lang="en-GB" dirty="0"/>
-              <a:t>Increase efficiency and accuracy, </a:t>
+              <a:t>When the time comes around to update your analysis with new data, how easy is it for you to reproduce the analysis you need? </a:t>
             </a:r>
           </a:p>
           <a:p>
             <a:pPr lvl="1"/>
             <a:r>
               <a:rPr lang="en-GB" dirty="0"/>
-              <a:t>Create a clear audit trail to allow analyses to easily be re-run if needed. </a:t>
-            </a:r>
-          </a:p>
-          <a:p>
-            <a:r>
-              <a:rPr lang="en-GB" dirty="0"/>
-              <a:t>This will free us up to focus on the parts of our work where our human input can really add value. </a:t>
-            </a:r>
-          </a:p>
-          <a:p>
-            <a:r>
-              <a:rPr lang="en-GB" dirty="0"/>
-              <a:t>RAP is something we can use to reduce the burden on us by getting rid of some of the boring stuff, what’s not to like!</a:t>
+              <a:t>Can the public reproduce your analysis?</a:t>
+            </a:r>
+          </a:p>
+          <a:p>
+            <a:r>
+              <a:rPr lang="en-GB" dirty="0"/>
+              <a:t>In an ideal RAP, it would be as simple as plugging the new data in and clicking 'go', with no need to manually scroll through multiple scripts updating the year in every file name or the variable name that's changed from using _ to -.</a:t>
             </a:r>
           </a:p>
         </p:txBody>
@@ -6002,7 +6181,7 @@
     </p:spTree>
     <p:extLst>
       <p:ext uri="{BB962C8B-B14F-4D97-AF65-F5344CB8AC3E}">
-        <p14:creationId xmlns:p14="http://schemas.microsoft.com/office/powerpoint/2010/main" val="1286926439"/>
+        <p14:creationId xmlns:p14="http://schemas.microsoft.com/office/powerpoint/2010/main" val="1410471086"/>
       </p:ext>
     </p:extLst>
   </p:cSld>
@@ -6034,7 +6213,7 @@
           <p:cNvPr id="2" name="Title 1">
             <a:extLst>
               <a:ext uri="{FF2B5EF4-FFF2-40B4-BE49-F238E27FC236}">
-                <a16:creationId xmlns:a16="http://schemas.microsoft.com/office/drawing/2014/main" id="{70271C04-0C12-C285-3E1B-74430A28B31B}"/>
+                <a16:creationId xmlns:a16="http://schemas.microsoft.com/office/drawing/2014/main" id="{4EBAFED2-1C42-5651-163B-8818BBF3005F}"/>
               </a:ext>
             </a:extLst>
           </p:cNvPr>
@@ -6050,152 +6229,78 @@
           <a:bodyPr/>
           <a:lstStyle/>
           <a:p>
-            <a:endParaRPr lang="en-GB"/>
-          </a:p>
-        </p:txBody>
-      </p:sp>
-      <p:pic>
-        <p:nvPicPr>
-          <p:cNvPr id="1026" name="Picture 2">
+            <a:r>
+              <a:rPr lang="en-GB" dirty="0"/>
+              <a:t>What are the benefits?</a:t>
+            </a:r>
+          </a:p>
+        </p:txBody>
+      </p:sp>
+      <p:sp>
+        <p:nvSpPr>
+          <p:cNvPr id="3" name="Content Placeholder 2">
             <a:extLst>
               <a:ext uri="{FF2B5EF4-FFF2-40B4-BE49-F238E27FC236}">
-                <a16:creationId xmlns:a16="http://schemas.microsoft.com/office/drawing/2014/main" id="{1F58B4BF-6286-D367-F8C0-6BBF6985DAFE}"/>
+                <a16:creationId xmlns:a16="http://schemas.microsoft.com/office/drawing/2014/main" id="{F3EFC132-8AC8-5B25-3629-B38C66AF4818}"/>
               </a:ext>
             </a:extLst>
           </p:cNvPr>
-          <p:cNvPicPr>
-            <a:picLocks noGrp="1" noChangeAspect="1" noChangeArrowheads="1"/>
-          </p:cNvPicPr>
+          <p:cNvSpPr>
+            <a:spLocks noGrp="1"/>
+          </p:cNvSpPr>
           <p:nvPr>
             <p:ph idx="1"/>
           </p:nvPr>
-        </p:nvPicPr>
-        <p:blipFill>
-          <a:blip r:embed="rId2">
-            <a:extLst>
-              <a:ext uri="{28A0092B-C50C-407E-A947-70E740481C1C}">
-                <a14:useLocalDpi xmlns:a14="http://schemas.microsoft.com/office/drawing/2010/main" val="0"/>
-              </a:ext>
-            </a:extLst>
-          </a:blip>
-          <a:srcRect/>
-          <a:stretch>
-            <a:fillRect/>
-          </a:stretch>
-        </p:blipFill>
-        <p:spPr bwMode="auto">
-          <a:xfrm>
-            <a:off x="1798637" y="97808"/>
-            <a:ext cx="8594725" cy="3331192"/>
-          </a:xfrm>
-          <a:prstGeom prst="rect">
-            <a:avLst/>
-          </a:prstGeom>
-          <a:noFill/>
-          <a:extLst>
-            <a:ext uri="{909E8E84-426E-40DD-AFC4-6F175D3DCCD1}">
-              <a14:hiddenFill xmlns:a14="http://schemas.microsoft.com/office/drawing/2010/main">
-                <a:solidFill>
-                  <a:srgbClr val="FFFFFF"/>
-                </a:solidFill>
-              </a14:hiddenFill>
-            </a:ext>
-          </a:extLst>
-        </p:spPr>
-      </p:pic>
-      <p:pic>
-        <p:nvPicPr>
-          <p:cNvPr id="1028" name="Picture 4">
-            <a:extLst>
-              <a:ext uri="{FF2B5EF4-FFF2-40B4-BE49-F238E27FC236}">
-                <a16:creationId xmlns:a16="http://schemas.microsoft.com/office/drawing/2014/main" id="{E87C30D8-DFD5-36C0-25BD-581F08C05B3F}"/>
-              </a:ext>
-            </a:extLst>
-          </p:cNvPr>
-          <p:cNvPicPr>
-            <a:picLocks noChangeAspect="1" noChangeArrowheads="1"/>
-          </p:cNvPicPr>
-          <p:nvPr/>
-        </p:nvPicPr>
-        <p:blipFill>
-          <a:blip r:embed="rId3">
-            <a:extLst>
-              <a:ext uri="{28A0092B-C50C-407E-A947-70E740481C1C}">
-                <a14:useLocalDpi xmlns:a14="http://schemas.microsoft.com/office/drawing/2010/main" val="0"/>
-              </a:ext>
-            </a:extLst>
-          </a:blip>
-          <a:srcRect/>
-          <a:stretch>
-            <a:fillRect/>
-          </a:stretch>
-        </p:blipFill>
-        <p:spPr bwMode="auto">
-          <a:xfrm>
-            <a:off x="618743" y="4848120"/>
-            <a:ext cx="10954512" cy="1683115"/>
-          </a:xfrm>
-          <a:prstGeom prst="rect">
-            <a:avLst/>
-          </a:prstGeom>
-          <a:noFill/>
-          <a:extLst>
-            <a:ext uri="{909E8E84-426E-40DD-AFC4-6F175D3DCCD1}">
-              <a14:hiddenFill xmlns:a14="http://schemas.microsoft.com/office/drawing/2010/main">
-                <a:solidFill>
-                  <a:srgbClr val="FFFFFF"/>
-                </a:solidFill>
-              </a14:hiddenFill>
-            </a:ext>
-          </a:extLst>
-        </p:spPr>
-      </p:pic>
-      <p:cxnSp>
-        <p:nvCxnSpPr>
-          <p:cNvPr id="5" name="Straight Arrow Connector 4">
-            <a:extLst>
-              <a:ext uri="{FF2B5EF4-FFF2-40B4-BE49-F238E27FC236}">
-                <a16:creationId xmlns:a16="http://schemas.microsoft.com/office/drawing/2014/main" id="{1E32565E-5CB9-A305-C4C9-7AA771471C03}"/>
-              </a:ext>
-            </a:extLst>
-          </p:cNvPr>
-          <p:cNvCxnSpPr/>
-          <p:nvPr/>
-        </p:nvCxnSpPr>
-        <p:spPr>
-          <a:xfrm>
-            <a:off x="6108192" y="3614468"/>
-            <a:ext cx="0" cy="1052423"/>
-          </a:xfrm>
-          <a:prstGeom prst="straightConnector1">
-            <a:avLst/>
-          </a:prstGeom>
-          <a:ln w="76200">
-            <a:solidFill>
-              <a:schemeClr val="tx1"/>
-            </a:solidFill>
-            <a:tailEnd type="triangle"/>
-          </a:ln>
-        </p:spPr>
-        <p:style>
-          <a:lnRef idx="1">
-            <a:schemeClr val="accent1"/>
-          </a:lnRef>
-          <a:fillRef idx="0">
-            <a:schemeClr val="accent1"/>
-          </a:fillRef>
-          <a:effectRef idx="0">
-            <a:schemeClr val="accent1"/>
-          </a:effectRef>
-          <a:fontRef idx="minor">
-            <a:schemeClr val="tx1"/>
-          </a:fontRef>
-        </p:style>
-      </p:cxnSp>
+        </p:nvSpPr>
+        <p:spPr/>
+        <p:txBody>
+          <a:bodyPr/>
+          <a:lstStyle/>
+          <a:p>
+            <a:r>
+              <a:rPr lang="en-GB" dirty="0"/>
+              <a:t>We already have ‘analytical pipelines’ and have done for many years. The aim of RAP is to;</a:t>
+            </a:r>
+          </a:p>
+          <a:p>
+            <a:pPr lvl="1"/>
+            <a:r>
+              <a:rPr lang="en-GB" dirty="0"/>
+              <a:t>Automate the parts of these pipelines that can be automated,</a:t>
+            </a:r>
+          </a:p>
+          <a:p>
+            <a:pPr lvl="1"/>
+            <a:r>
+              <a:rPr lang="en-GB" dirty="0"/>
+              <a:t>Increase efficiency and accuracy, </a:t>
+            </a:r>
+          </a:p>
+          <a:p>
+            <a:pPr lvl="1"/>
+            <a:r>
+              <a:rPr lang="en-GB" dirty="0"/>
+              <a:t>Create a clear audit trail to allow analyses to easily be re-run if needed. </a:t>
+            </a:r>
+          </a:p>
+          <a:p>
+            <a:r>
+              <a:rPr lang="en-GB" dirty="0"/>
+              <a:t>This will free us up to focus on the parts of our work where our human input can really add value. </a:t>
+            </a:r>
+          </a:p>
+          <a:p>
+            <a:r>
+              <a:rPr lang="en-GB" dirty="0"/>
+              <a:t>RAP is something we can use to reduce the burden on us by getting rid of some of the boring stuff, what’s not to like!</a:t>
+            </a:r>
+          </a:p>
+        </p:txBody>
+      </p:sp>
     </p:spTree>
     <p:extLst>
       <p:ext uri="{BB962C8B-B14F-4D97-AF65-F5344CB8AC3E}">
-        <p14:creationId xmlns:p14="http://schemas.microsoft.com/office/powerpoint/2010/main" val="2713344255"/>
+        <p14:creationId xmlns:p14="http://schemas.microsoft.com/office/powerpoint/2010/main" val="1286926439"/>
       </p:ext>
     </p:extLst>
   </p:cSld>

</xml_diff>